<commit_message>
updates T exemplos em src/fso
</commit_message>
<xml_diff>
--- a/aulas/t/old/SCO-T1-A05-A06.pptx
+++ b/aulas/t/old/SCO-T1-A05-A06.pptx
@@ -9348,12 +9348,17 @@
             </a:pPr>
             <a:r>
               <a:rPr lang="pt-PT" sz="2800" b="0" i="0" dirty="0"/>
-              <a:t>Password Geral: </a:t>
-            </a:r>
-            <a:r>
-              <a:rPr lang="pt-PT" sz="2800" i="0" dirty="0"/>
-              <a:t>sc2021</a:t>
-            </a:r>
+              <a:t>Password Geral</a:t>
+            </a:r>
+            <a:r>
+              <a:rPr lang="pt-PT" sz="2800" b="0" i="0"/>
+              <a:t>: </a:t>
+            </a:r>
+            <a:r>
+              <a:rPr lang="pt-PT" sz="2800" i="0"/>
+              <a:t>sc2122</a:t>
+            </a:r>
+            <a:endParaRPr lang="pt-PT" sz="2800" i="0" dirty="0"/>
           </a:p>
           <a:p>
             <a:pPr marL="357188" lvl="1" indent="-177800" algn="l" defTabSz="704085">
@@ -9390,7 +9395,7 @@
             </a:pPr>
             <a:r>
               <a:rPr lang="pt-PT" sz="2000" i="0" dirty="0"/>
-              <a:t>2 conjuntos (base e standard) de 2 questões (em 5) + 1 questão (em 5 do conjunto Hard)</a:t>
+              <a:t>2 conjuntos (base e standard) de 2 questões (em 5+) + 1 questão (em 4+ do conjunto Hard)</a:t>
             </a:r>
             <a:r>
               <a:rPr lang="pt-PT" sz="2000" b="0" i="0" dirty="0"/>
@@ -9411,7 +9416,7 @@
             </a:r>
             <a:r>
               <a:rPr lang="pt-PT" sz="2000" i="0" dirty="0"/>
-              <a:t>16h de quinta 31 de março </a:t>
+              <a:t>18h de quinta 31 de março </a:t>
             </a:r>
             <a:r>
               <a:rPr lang="pt-PT" sz="2000" b="0" i="0" dirty="0"/>

</xml_diff>